<commit_message>
last 6 chapter drafts
</commit_message>
<xml_diff>
--- a/Class Slides 2024/Class 13.pptx
+++ b/Class Slides 2024/Class 13.pptx
@@ -5,7 +5,7 @@
     <p:sldMasterId id="2147483648" r:id="rId1"/>
   </p:sldMasterIdLst>
   <p:notesMasterIdLst>
-    <p:notesMasterId r:id="rId21"/>
+    <p:notesMasterId r:id="rId19"/>
   </p:notesMasterIdLst>
   <p:sldIdLst>
     <p:sldId id="256" r:id="rId2"/>
@@ -25,8 +25,6 @@
     <p:sldId id="370" r:id="rId16"/>
     <p:sldId id="371" r:id="rId17"/>
     <p:sldId id="372" r:id="rId18"/>
-    <p:sldId id="264" r:id="rId19"/>
-    <p:sldId id="265" r:id="rId20"/>
   </p:sldIdLst>
   <p:sldSz cx="12192000" cy="6858000"/>
   <p:notesSz cx="7102475" cy="9388475"/>
@@ -215,7 +213,7 @@
           <a:p>
             <a:fld id="{BAACF679-9C21-4F71-9D51-DB3DE1CFD6F5}" type="datetimeFigureOut">
               <a:rPr lang="en-US" smtClean="0"/>
-              <a:t>2/1/2024</a:t>
+              <a:t>2/4/2024</a:t>
             </a:fld>
             <a:endParaRPr lang="en-US"/>
           </a:p>
@@ -746,192 +744,6 @@
 </p:notes>
 </file>
 
-<file path=ppt/notesSlides/notesSlide3.xml><?xml version="1.0" encoding="utf-8"?>
-<p:notes xmlns:a="http://schemas.openxmlformats.org/drawingml/2006/main" xmlns:r="http://schemas.openxmlformats.org/officeDocument/2006/relationships" xmlns:p="http://schemas.openxmlformats.org/presentationml/2006/main">
-  <p:cSld>
-    <p:spTree>
-      <p:nvGrpSpPr>
-        <p:cNvPr id="1" name=""/>
-        <p:cNvGrpSpPr/>
-        <p:nvPr/>
-      </p:nvGrpSpPr>
-      <p:grpSpPr>
-        <a:xfrm>
-          <a:off x="0" y="0"/>
-          <a:ext cx="0" cy="0"/>
-          <a:chOff x="0" y="0"/>
-          <a:chExt cx="0" cy="0"/>
-        </a:xfrm>
-      </p:grpSpPr>
-      <p:sp>
-        <p:nvSpPr>
-          <p:cNvPr id="40962" name="Rectangle 7"/>
-          <p:cNvSpPr>
-            <a:spLocks noGrp="1" noChangeArrowheads="1"/>
-          </p:cNvSpPr>
-          <p:nvPr>
-            <p:ph type="sldNum" sz="quarter" idx="5"/>
-          </p:nvPr>
-        </p:nvSpPr>
-        <p:spPr>
-          <a:noFill/>
-        </p:spPr>
-        <p:txBody>
-          <a:bodyPr/>
-          <a:lstStyle/>
-          <a:p>
-            <a:fld id="{3E400DAB-D642-4450-9FB8-7E8059C75B16}" type="slidenum">
-              <a:rPr lang="en-US" smtClean="0"/>
-              <a:pPr/>
-              <a:t>18</a:t>
-            </a:fld>
-            <a:endParaRPr lang="en-US"/>
-          </a:p>
-        </p:txBody>
-      </p:sp>
-      <p:sp>
-        <p:nvSpPr>
-          <p:cNvPr id="40963" name="Rectangle 2"/>
-          <p:cNvSpPr>
-            <a:spLocks noGrp="1" noRot="1" noChangeAspect="1" noChangeArrowheads="1" noTextEdit="1"/>
-          </p:cNvSpPr>
-          <p:nvPr>
-            <p:ph type="sldImg"/>
-          </p:nvPr>
-        </p:nvSpPr>
-        <p:spPr>
-          <a:ln/>
-        </p:spPr>
-      </p:sp>
-      <p:sp>
-        <p:nvSpPr>
-          <p:cNvPr id="40964" name="Rectangle 3"/>
-          <p:cNvSpPr>
-            <a:spLocks noGrp="1" noChangeArrowheads="1"/>
-          </p:cNvSpPr>
-          <p:nvPr>
-            <p:ph type="body" idx="1"/>
-          </p:nvPr>
-        </p:nvSpPr>
-        <p:spPr>
-          <a:noFill/>
-          <a:ln/>
-        </p:spPr>
-        <p:txBody>
-          <a:bodyPr/>
-          <a:lstStyle/>
-          <a:p>
-            <a:pPr eaLnBrk="1" hangingPunct="1"/>
-            <a:endParaRPr lang="en-US"/>
-          </a:p>
-        </p:txBody>
-      </p:sp>
-    </p:spTree>
-    <p:extLst>
-      <p:ext uri="{BB962C8B-B14F-4D97-AF65-F5344CB8AC3E}">
-        <p14:creationId xmlns:p14="http://schemas.microsoft.com/office/powerpoint/2010/main" val="422806644"/>
-      </p:ext>
-    </p:extLst>
-  </p:cSld>
-  <p:clrMapOvr>
-    <a:masterClrMapping/>
-  </p:clrMapOvr>
-</p:notes>
-</file>
-
-<file path=ppt/notesSlides/notesSlide4.xml><?xml version="1.0" encoding="utf-8"?>
-<p:notes xmlns:a="http://schemas.openxmlformats.org/drawingml/2006/main" xmlns:r="http://schemas.openxmlformats.org/officeDocument/2006/relationships" xmlns:p="http://schemas.openxmlformats.org/presentationml/2006/main">
-  <p:cSld>
-    <p:spTree>
-      <p:nvGrpSpPr>
-        <p:cNvPr id="1" name=""/>
-        <p:cNvGrpSpPr/>
-        <p:nvPr/>
-      </p:nvGrpSpPr>
-      <p:grpSpPr>
-        <a:xfrm>
-          <a:off x="0" y="0"/>
-          <a:ext cx="0" cy="0"/>
-          <a:chOff x="0" y="0"/>
-          <a:chExt cx="0" cy="0"/>
-        </a:xfrm>
-      </p:grpSpPr>
-      <p:sp>
-        <p:nvSpPr>
-          <p:cNvPr id="41986" name="Rectangle 7"/>
-          <p:cNvSpPr>
-            <a:spLocks noGrp="1" noChangeArrowheads="1"/>
-          </p:cNvSpPr>
-          <p:nvPr>
-            <p:ph type="sldNum" sz="quarter" idx="5"/>
-          </p:nvPr>
-        </p:nvSpPr>
-        <p:spPr>
-          <a:noFill/>
-        </p:spPr>
-        <p:txBody>
-          <a:bodyPr/>
-          <a:lstStyle/>
-          <a:p>
-            <a:fld id="{ED835882-5389-4FD0-8253-4B5D9C1C44F0}" type="slidenum">
-              <a:rPr lang="en-US" smtClean="0"/>
-              <a:pPr/>
-              <a:t>19</a:t>
-            </a:fld>
-            <a:endParaRPr lang="en-US"/>
-          </a:p>
-        </p:txBody>
-      </p:sp>
-      <p:sp>
-        <p:nvSpPr>
-          <p:cNvPr id="41987" name="Rectangle 2"/>
-          <p:cNvSpPr>
-            <a:spLocks noGrp="1" noRot="1" noChangeAspect="1" noChangeArrowheads="1" noTextEdit="1"/>
-          </p:cNvSpPr>
-          <p:nvPr>
-            <p:ph type="sldImg"/>
-          </p:nvPr>
-        </p:nvSpPr>
-        <p:spPr>
-          <a:ln/>
-        </p:spPr>
-      </p:sp>
-      <p:sp>
-        <p:nvSpPr>
-          <p:cNvPr id="41988" name="Rectangle 3"/>
-          <p:cNvSpPr>
-            <a:spLocks noGrp="1" noChangeArrowheads="1"/>
-          </p:cNvSpPr>
-          <p:nvPr>
-            <p:ph type="body" idx="1"/>
-          </p:nvPr>
-        </p:nvSpPr>
-        <p:spPr>
-          <a:noFill/>
-          <a:ln/>
-        </p:spPr>
-        <p:txBody>
-          <a:bodyPr/>
-          <a:lstStyle/>
-          <a:p>
-            <a:pPr eaLnBrk="1" hangingPunct="1"/>
-            <a:endParaRPr lang="en-US"/>
-          </a:p>
-        </p:txBody>
-      </p:sp>
-    </p:spTree>
-    <p:extLst>
-      <p:ext uri="{BB962C8B-B14F-4D97-AF65-F5344CB8AC3E}">
-        <p14:creationId xmlns:p14="http://schemas.microsoft.com/office/powerpoint/2010/main" val="911337627"/>
-      </p:ext>
-    </p:extLst>
-  </p:cSld>
-  <p:clrMapOvr>
-    <a:masterClrMapping/>
-  </p:clrMapOvr>
-</p:notes>
-</file>
-
 <file path=ppt/slideLayouts/slideLayout1.xml><?xml version="1.0" encoding="utf-8"?>
 <p:sldLayout xmlns:a="http://schemas.openxmlformats.org/drawingml/2006/main" xmlns:r="http://schemas.openxmlformats.org/officeDocument/2006/relationships" xmlns:p="http://schemas.openxmlformats.org/presentationml/2006/main" type="title" preserve="1">
   <p:cSld name="Title Slide">
@@ -1079,7 +891,7 @@
           <a:p>
             <a:fld id="{AD25D140-AA2F-4541-9D95-F387ECD5A22D}" type="datetimeFigureOut">
               <a:rPr lang="en-US" smtClean="0"/>
-              <a:t>2/1/2024</a:t>
+              <a:t>2/4/2024</a:t>
             </a:fld>
             <a:endParaRPr lang="en-US"/>
           </a:p>
@@ -1277,7 +1089,7 @@
           <a:p>
             <a:fld id="{AD25D140-AA2F-4541-9D95-F387ECD5A22D}" type="datetimeFigureOut">
               <a:rPr lang="en-US" smtClean="0"/>
-              <a:t>2/1/2024</a:t>
+              <a:t>2/4/2024</a:t>
             </a:fld>
             <a:endParaRPr lang="en-US"/>
           </a:p>
@@ -1485,7 +1297,7 @@
           <a:p>
             <a:fld id="{AD25D140-AA2F-4541-9D95-F387ECD5A22D}" type="datetimeFigureOut">
               <a:rPr lang="en-US" smtClean="0"/>
-              <a:t>2/1/2024</a:t>
+              <a:t>2/4/2024</a:t>
             </a:fld>
             <a:endParaRPr lang="en-US"/>
           </a:p>
@@ -1683,7 +1495,7 @@
           <a:p>
             <a:fld id="{AD25D140-AA2F-4541-9D95-F387ECD5A22D}" type="datetimeFigureOut">
               <a:rPr lang="en-US" smtClean="0"/>
-              <a:t>2/1/2024</a:t>
+              <a:t>2/4/2024</a:t>
             </a:fld>
             <a:endParaRPr lang="en-US"/>
           </a:p>
@@ -1958,7 +1770,7 @@
           <a:p>
             <a:fld id="{AD25D140-AA2F-4541-9D95-F387ECD5A22D}" type="datetimeFigureOut">
               <a:rPr lang="en-US" smtClean="0"/>
-              <a:t>2/1/2024</a:t>
+              <a:t>2/4/2024</a:t>
             </a:fld>
             <a:endParaRPr lang="en-US"/>
           </a:p>
@@ -2223,7 +2035,7 @@
           <a:p>
             <a:fld id="{AD25D140-AA2F-4541-9D95-F387ECD5A22D}" type="datetimeFigureOut">
               <a:rPr lang="en-US" smtClean="0"/>
-              <a:t>2/1/2024</a:t>
+              <a:t>2/4/2024</a:t>
             </a:fld>
             <a:endParaRPr lang="en-US"/>
           </a:p>
@@ -2635,7 +2447,7 @@
           <a:p>
             <a:fld id="{AD25D140-AA2F-4541-9D95-F387ECD5A22D}" type="datetimeFigureOut">
               <a:rPr lang="en-US" smtClean="0"/>
-              <a:t>2/1/2024</a:t>
+              <a:t>2/4/2024</a:t>
             </a:fld>
             <a:endParaRPr lang="en-US"/>
           </a:p>
@@ -2776,7 +2588,7 @@
           <a:p>
             <a:fld id="{AD25D140-AA2F-4541-9D95-F387ECD5A22D}" type="datetimeFigureOut">
               <a:rPr lang="en-US" smtClean="0"/>
-              <a:t>2/1/2024</a:t>
+              <a:t>2/4/2024</a:t>
             </a:fld>
             <a:endParaRPr lang="en-US"/>
           </a:p>
@@ -2889,7 +2701,7 @@
           <a:p>
             <a:fld id="{AD25D140-AA2F-4541-9D95-F387ECD5A22D}" type="datetimeFigureOut">
               <a:rPr lang="en-US" smtClean="0"/>
-              <a:t>2/1/2024</a:t>
+              <a:t>2/4/2024</a:t>
             </a:fld>
             <a:endParaRPr lang="en-US"/>
           </a:p>
@@ -3200,7 +3012,7 @@
           <a:p>
             <a:fld id="{AD25D140-AA2F-4541-9D95-F387ECD5A22D}" type="datetimeFigureOut">
               <a:rPr lang="en-US" smtClean="0"/>
-              <a:t>2/1/2024</a:t>
+              <a:t>2/4/2024</a:t>
             </a:fld>
             <a:endParaRPr lang="en-US"/>
           </a:p>
@@ -3488,7 +3300,7 @@
           <a:p>
             <a:fld id="{AD25D140-AA2F-4541-9D95-F387ECD5A22D}" type="datetimeFigureOut">
               <a:rPr lang="en-US" smtClean="0"/>
-              <a:t>2/1/2024</a:t>
+              <a:t>2/4/2024</a:t>
             </a:fld>
             <a:endParaRPr lang="en-US"/>
           </a:p>
@@ -3729,7 +3541,7 @@
           <a:p>
             <a:fld id="{AD25D140-AA2F-4541-9D95-F387ECD5A22D}" type="datetimeFigureOut">
               <a:rPr lang="en-US" smtClean="0"/>
-              <a:t>2/1/2024</a:t>
+              <a:t>2/4/2024</a:t>
             </a:fld>
             <a:endParaRPr lang="en-US"/>
           </a:p>
@@ -5328,1265 +5140,6 @@
   <p:clrMapOvr>
     <a:masterClrMapping/>
   </p:clrMapOvr>
-</p:sld>
-</file>
-
-<file path=ppt/slides/slide18.xml><?xml version="1.0" encoding="utf-8"?>
-<p:sld xmlns:a="http://schemas.openxmlformats.org/drawingml/2006/main" xmlns:r="http://schemas.openxmlformats.org/officeDocument/2006/relationships" xmlns:p="http://schemas.openxmlformats.org/presentationml/2006/main">
-  <p:cSld>
-    <p:spTree>
-      <p:nvGrpSpPr>
-        <p:cNvPr id="1" name=""/>
-        <p:cNvGrpSpPr/>
-        <p:nvPr/>
-      </p:nvGrpSpPr>
-      <p:grpSpPr>
-        <a:xfrm>
-          <a:off x="0" y="0"/>
-          <a:ext cx="0" cy="0"/>
-          <a:chOff x="0" y="0"/>
-          <a:chExt cx="0" cy="0"/>
-        </a:xfrm>
-      </p:grpSpPr>
-      <p:sp>
-        <p:nvSpPr>
-          <p:cNvPr id="18434" name="Rectangle 2"/>
-          <p:cNvSpPr>
-            <a:spLocks noGrp="1" noChangeArrowheads="1"/>
-          </p:cNvSpPr>
-          <p:nvPr>
-            <p:ph type="title"/>
-          </p:nvPr>
-        </p:nvSpPr>
-        <p:spPr/>
-        <p:txBody>
-          <a:bodyPr/>
-          <a:lstStyle/>
-          <a:p>
-            <a:pPr eaLnBrk="1" hangingPunct="1"/>
-            <a:r>
-              <a:rPr lang="en-US" dirty="0"/>
-              <a:t>The grass is always greener on the other side</a:t>
-            </a:r>
-          </a:p>
-        </p:txBody>
-      </p:sp>
-      <p:sp>
-        <p:nvSpPr>
-          <p:cNvPr id="18435" name="Rectangle 3"/>
-          <p:cNvSpPr>
-            <a:spLocks noGrp="1" noChangeArrowheads="1"/>
-          </p:cNvSpPr>
-          <p:nvPr>
-            <p:ph type="body" idx="1"/>
-          </p:nvPr>
-        </p:nvSpPr>
-        <p:spPr/>
-        <p:txBody>
-          <a:bodyPr/>
-          <a:lstStyle/>
-          <a:p>
-            <a:pPr eaLnBrk="1" hangingPunct="1"/>
-            <a:r>
-              <a:rPr lang="en-US" dirty="0"/>
-              <a:t>Design a 2x2 between-participants factorial experiment to test the everyday meaning of this aphorism.  </a:t>
-            </a:r>
-          </a:p>
-          <a:p>
-            <a:pPr eaLnBrk="1" hangingPunct="1"/>
-            <a:r>
-              <a:rPr lang="en-US" dirty="0"/>
-              <a:t>Use subjects high and low in optimism as one factor in the design.</a:t>
-            </a:r>
-          </a:p>
-          <a:p>
-            <a:pPr eaLnBrk="1" hangingPunct="1"/>
-            <a:r>
-              <a:rPr lang="en-US" dirty="0"/>
-              <a:t>Give predicted results consistent with the idea that the grass on the other side will look greener and it will look particularly greener to optimists.</a:t>
-            </a:r>
-          </a:p>
-        </p:txBody>
-      </p:sp>
-    </p:spTree>
-    <p:extLst>
-      <p:ext uri="{BB962C8B-B14F-4D97-AF65-F5344CB8AC3E}">
-        <p14:creationId xmlns:p14="http://schemas.microsoft.com/office/powerpoint/2010/main" val="313001261"/>
-      </p:ext>
-    </p:extLst>
-  </p:cSld>
-  <p:clrMapOvr>
-    <a:masterClrMapping/>
-  </p:clrMapOvr>
-</p:sld>
-</file>
-
-<file path=ppt/slides/slide19.xml><?xml version="1.0" encoding="utf-8"?>
-<p:sld xmlns:a="http://schemas.openxmlformats.org/drawingml/2006/main" xmlns:r="http://schemas.openxmlformats.org/officeDocument/2006/relationships" xmlns:p="http://schemas.openxmlformats.org/presentationml/2006/main">
-  <p:cSld>
-    <p:spTree>
-      <p:nvGrpSpPr>
-        <p:cNvPr id="1" name=""/>
-        <p:cNvGrpSpPr/>
-        <p:nvPr/>
-      </p:nvGrpSpPr>
-      <p:grpSpPr>
-        <a:xfrm>
-          <a:off x="0" y="0"/>
-          <a:ext cx="0" cy="0"/>
-          <a:chOff x="0" y="0"/>
-          <a:chExt cx="0" cy="0"/>
-        </a:xfrm>
-      </p:grpSpPr>
-      <p:graphicFrame>
-        <p:nvGraphicFramePr>
-          <p:cNvPr id="49154" name="Group 2"/>
-          <p:cNvGraphicFramePr>
-            <a:graphicFrameLocks noGrp="1"/>
-          </p:cNvGraphicFramePr>
-          <p:nvPr/>
-        </p:nvGraphicFramePr>
-        <p:xfrm>
-          <a:off x="1828800" y="228600"/>
-          <a:ext cx="4038600" cy="2781300"/>
-        </p:xfrm>
-        <a:graphic>
-          <a:graphicData uri="http://schemas.openxmlformats.org/drawingml/2006/table">
-            <a:tbl>
-              <a:tblPr/>
-              <a:tblGrid>
-                <a:gridCol w="1676400">
-                  <a:extLst>
-                    <a:ext uri="{9D8B030D-6E8A-4147-A177-3AD203B41FA5}">
-                      <a16:colId xmlns:a16="http://schemas.microsoft.com/office/drawing/2014/main" val="20000"/>
-                    </a:ext>
-                  </a:extLst>
-                </a:gridCol>
-                <a:gridCol w="1143000">
-                  <a:extLst>
-                    <a:ext uri="{9D8B030D-6E8A-4147-A177-3AD203B41FA5}">
-                      <a16:colId xmlns:a16="http://schemas.microsoft.com/office/drawing/2014/main" val="20001"/>
-                    </a:ext>
-                  </a:extLst>
-                </a:gridCol>
-                <a:gridCol w="1219200">
-                  <a:extLst>
-                    <a:ext uri="{9D8B030D-6E8A-4147-A177-3AD203B41FA5}">
-                      <a16:colId xmlns:a16="http://schemas.microsoft.com/office/drawing/2014/main" val="20002"/>
-                    </a:ext>
-                  </a:extLst>
-                </a:gridCol>
-              </a:tblGrid>
-              <a:tr h="1016000">
-                <a:tc>
-                  <a:txBody>
-                    <a:bodyPr/>
-                    <a:lstStyle/>
-                    <a:p>
-                      <a:pPr marL="0" marR="0" lvl="0" indent="0" algn="l" defTabSz="914400" rtl="0" eaLnBrk="1" fontAlgn="base" latinLnBrk="0" hangingPunct="1">
-                        <a:lnSpc>
-                          <a:spcPct val="100000"/>
-                        </a:lnSpc>
-                        <a:spcBef>
-                          <a:spcPct val="20000"/>
-                        </a:spcBef>
-                        <a:spcAft>
-                          <a:spcPct val="0"/>
-                        </a:spcAft>
-                        <a:buClrTx/>
-                        <a:buSzTx/>
-                        <a:buFontTx/>
-                        <a:buNone/>
-                        <a:tabLst/>
-                      </a:pPr>
-                      <a:endParaRPr kumimoji="0" lang="en-US" sz="2400" b="0" i="0" u="none" strike="noStrike" cap="none" normalizeH="0" baseline="0">
-                        <a:ln>
-                          <a:noFill/>
-                        </a:ln>
-                        <a:solidFill>
-                          <a:schemeClr val="tx1"/>
-                        </a:solidFill>
-                        <a:effectLst/>
-                        <a:latin typeface="Arial" charset="0"/>
-                      </a:endParaRPr>
-                    </a:p>
-                  </a:txBody>
-                  <a:tcPr horzOverflow="overflow">
-                    <a:lnL w="28575" cap="flat" cmpd="sng" algn="ctr">
-                      <a:solidFill>
-                        <a:schemeClr val="tx1"/>
-                      </a:solidFill>
-                      <a:prstDash val="solid"/>
-                      <a:round/>
-                      <a:headEnd type="none" w="med" len="med"/>
-                      <a:tailEnd type="none" w="med" len="med"/>
-                    </a:lnL>
-                    <a:lnR w="12700" cap="flat" cmpd="sng" algn="ctr">
-                      <a:solidFill>
-                        <a:schemeClr val="tx1"/>
-                      </a:solidFill>
-                      <a:prstDash val="solid"/>
-                      <a:round/>
-                      <a:headEnd type="none" w="med" len="med"/>
-                      <a:tailEnd type="none" w="med" len="med"/>
-                    </a:lnR>
-                    <a:lnT w="28575" cap="flat" cmpd="sng" algn="ctr">
-                      <a:solidFill>
-                        <a:schemeClr val="tx1"/>
-                      </a:solidFill>
-                      <a:prstDash val="solid"/>
-                      <a:round/>
-                      <a:headEnd type="none" w="med" len="med"/>
-                      <a:tailEnd type="none" w="med" len="med"/>
-                    </a:lnT>
-                    <a:lnB w="12700" cap="flat" cmpd="sng" algn="ctr">
-                      <a:solidFill>
-                        <a:schemeClr val="tx1"/>
-                      </a:solidFill>
-                      <a:prstDash val="solid"/>
-                      <a:round/>
-                      <a:headEnd type="none" w="med" len="med"/>
-                      <a:tailEnd type="none" w="med" len="med"/>
-                    </a:lnB>
-                    <a:lnTlToBr>
-                      <a:noFill/>
-                    </a:lnTlToBr>
-                    <a:lnBlToTr>
-                      <a:noFill/>
-                    </a:lnBlToTr>
-                    <a:noFill/>
-                  </a:tcPr>
-                </a:tc>
-                <a:tc>
-                  <a:txBody>
-                    <a:bodyPr/>
-                    <a:lstStyle/>
-                    <a:p>
-                      <a:pPr marL="0" marR="0" lvl="0" indent="0" algn="ctr" defTabSz="914400" rtl="0" eaLnBrk="1" fontAlgn="base" latinLnBrk="0" hangingPunct="1">
-                        <a:lnSpc>
-                          <a:spcPct val="100000"/>
-                        </a:lnSpc>
-                        <a:spcBef>
-                          <a:spcPct val="20000"/>
-                        </a:spcBef>
-                        <a:spcAft>
-                          <a:spcPct val="0"/>
-                        </a:spcAft>
-                        <a:buClrTx/>
-                        <a:buSzTx/>
-                        <a:buFontTx/>
-                        <a:buNone/>
-                        <a:tabLst/>
-                      </a:pPr>
-                      <a:r>
-                        <a:rPr kumimoji="0" lang="en-US" sz="2400" b="0" i="0" u="none" strike="noStrike" cap="none" normalizeH="0" baseline="0">
-                          <a:ln>
-                            <a:noFill/>
-                          </a:ln>
-                          <a:solidFill>
-                            <a:schemeClr val="tx1"/>
-                          </a:solidFill>
-                          <a:effectLst/>
-                          <a:latin typeface="Arial" charset="0"/>
-                        </a:rPr>
-                        <a:t>Near</a:t>
-                      </a:r>
-                    </a:p>
-                  </a:txBody>
-                  <a:tcPr horzOverflow="overflow">
-                    <a:lnL w="12700" cap="flat" cmpd="sng" algn="ctr">
-                      <a:solidFill>
-                        <a:schemeClr val="tx1"/>
-                      </a:solidFill>
-                      <a:prstDash val="solid"/>
-                      <a:round/>
-                      <a:headEnd type="none" w="med" len="med"/>
-                      <a:tailEnd type="none" w="med" len="med"/>
-                    </a:lnL>
-                    <a:lnR w="12700" cap="flat" cmpd="sng" algn="ctr">
-                      <a:solidFill>
-                        <a:schemeClr val="tx1"/>
-                      </a:solidFill>
-                      <a:prstDash val="solid"/>
-                      <a:round/>
-                      <a:headEnd type="none" w="med" len="med"/>
-                      <a:tailEnd type="none" w="med" len="med"/>
-                    </a:lnR>
-                    <a:lnT w="28575" cap="flat" cmpd="sng" algn="ctr">
-                      <a:solidFill>
-                        <a:schemeClr val="tx1"/>
-                      </a:solidFill>
-                      <a:prstDash val="solid"/>
-                      <a:round/>
-                      <a:headEnd type="none" w="med" len="med"/>
-                      <a:tailEnd type="none" w="med" len="med"/>
-                    </a:lnT>
-                    <a:lnB w="12700" cap="flat" cmpd="sng" algn="ctr">
-                      <a:solidFill>
-                        <a:schemeClr val="tx1"/>
-                      </a:solidFill>
-                      <a:prstDash val="solid"/>
-                      <a:round/>
-                      <a:headEnd type="none" w="med" len="med"/>
-                      <a:tailEnd type="none" w="med" len="med"/>
-                    </a:lnB>
-                    <a:lnTlToBr>
-                      <a:noFill/>
-                    </a:lnTlToBr>
-                    <a:lnBlToTr>
-                      <a:noFill/>
-                    </a:lnBlToTr>
-                    <a:noFill/>
-                  </a:tcPr>
-                </a:tc>
-                <a:tc>
-                  <a:txBody>
-                    <a:bodyPr/>
-                    <a:lstStyle/>
-                    <a:p>
-                      <a:pPr marL="0" marR="0" lvl="0" indent="0" algn="ctr" defTabSz="914400" rtl="0" eaLnBrk="1" fontAlgn="base" latinLnBrk="0" hangingPunct="1">
-                        <a:lnSpc>
-                          <a:spcPct val="100000"/>
-                        </a:lnSpc>
-                        <a:spcBef>
-                          <a:spcPct val="20000"/>
-                        </a:spcBef>
-                        <a:spcAft>
-                          <a:spcPct val="0"/>
-                        </a:spcAft>
-                        <a:buClrTx/>
-                        <a:buSzTx/>
-                        <a:buFontTx/>
-                        <a:buNone/>
-                        <a:tabLst/>
-                      </a:pPr>
-                      <a:r>
-                        <a:rPr kumimoji="0" lang="en-US" sz="2400" b="0" i="0" u="none" strike="noStrike" cap="none" normalizeH="0" baseline="0">
-                          <a:ln>
-                            <a:noFill/>
-                          </a:ln>
-                          <a:solidFill>
-                            <a:schemeClr val="tx1"/>
-                          </a:solidFill>
-                          <a:effectLst/>
-                          <a:latin typeface="Arial" charset="0"/>
-                        </a:rPr>
-                        <a:t>Far</a:t>
-                      </a:r>
-                    </a:p>
-                  </a:txBody>
-                  <a:tcPr horzOverflow="overflow">
-                    <a:lnL w="12700" cap="flat" cmpd="sng" algn="ctr">
-                      <a:solidFill>
-                        <a:schemeClr val="tx1"/>
-                      </a:solidFill>
-                      <a:prstDash val="solid"/>
-                      <a:round/>
-                      <a:headEnd type="none" w="med" len="med"/>
-                      <a:tailEnd type="none" w="med" len="med"/>
-                    </a:lnL>
-                    <a:lnR w="28575" cap="flat" cmpd="sng" algn="ctr">
-                      <a:solidFill>
-                        <a:schemeClr val="tx1"/>
-                      </a:solidFill>
-                      <a:prstDash val="solid"/>
-                      <a:round/>
-                      <a:headEnd type="none" w="med" len="med"/>
-                      <a:tailEnd type="none" w="med" len="med"/>
-                    </a:lnR>
-                    <a:lnT w="28575" cap="flat" cmpd="sng" algn="ctr">
-                      <a:solidFill>
-                        <a:schemeClr val="tx1"/>
-                      </a:solidFill>
-                      <a:prstDash val="solid"/>
-                      <a:round/>
-                      <a:headEnd type="none" w="med" len="med"/>
-                      <a:tailEnd type="none" w="med" len="med"/>
-                    </a:lnT>
-                    <a:lnB w="12700" cap="flat" cmpd="sng" algn="ctr">
-                      <a:solidFill>
-                        <a:schemeClr val="tx1"/>
-                      </a:solidFill>
-                      <a:prstDash val="solid"/>
-                      <a:round/>
-                      <a:headEnd type="none" w="med" len="med"/>
-                      <a:tailEnd type="none" w="med" len="med"/>
-                    </a:lnB>
-                    <a:lnTlToBr>
-                      <a:noFill/>
-                    </a:lnTlToBr>
-                    <a:lnBlToTr>
-                      <a:noFill/>
-                    </a:lnBlToTr>
-                    <a:noFill/>
-                  </a:tcPr>
-                </a:tc>
-                <a:extLst>
-                  <a:ext uri="{0D108BD9-81ED-4DB2-BD59-A6C34878D82A}">
-                    <a16:rowId xmlns:a16="http://schemas.microsoft.com/office/drawing/2014/main" val="10000"/>
-                  </a:ext>
-                </a:extLst>
-              </a:tr>
-              <a:tr h="882650">
-                <a:tc>
-                  <a:txBody>
-                    <a:bodyPr/>
-                    <a:lstStyle/>
-                    <a:p>
-                      <a:pPr marL="0" marR="0" lvl="0" indent="0" algn="l" defTabSz="914400" rtl="0" eaLnBrk="1" fontAlgn="base" latinLnBrk="0" hangingPunct="1">
-                        <a:lnSpc>
-                          <a:spcPct val="100000"/>
-                        </a:lnSpc>
-                        <a:spcBef>
-                          <a:spcPct val="20000"/>
-                        </a:spcBef>
-                        <a:spcAft>
-                          <a:spcPct val="0"/>
-                        </a:spcAft>
-                        <a:buClrTx/>
-                        <a:buSzTx/>
-                        <a:buFontTx/>
-                        <a:buNone/>
-                        <a:tabLst/>
-                      </a:pPr>
-                      <a:r>
-                        <a:rPr kumimoji="0" lang="en-US" sz="2400" b="0" i="0" u="none" strike="noStrike" cap="none" normalizeH="0" baseline="0">
-                          <a:ln>
-                            <a:noFill/>
-                          </a:ln>
-                          <a:solidFill>
-                            <a:schemeClr val="tx1"/>
-                          </a:solidFill>
-                          <a:effectLst/>
-                          <a:latin typeface="Arial" charset="0"/>
-                        </a:rPr>
-                        <a:t>Optimists</a:t>
-                      </a:r>
-                    </a:p>
-                  </a:txBody>
-                  <a:tcPr horzOverflow="overflow">
-                    <a:lnL w="28575" cap="flat" cmpd="sng" algn="ctr">
-                      <a:solidFill>
-                        <a:schemeClr val="tx1"/>
-                      </a:solidFill>
-                      <a:prstDash val="solid"/>
-                      <a:round/>
-                      <a:headEnd type="none" w="med" len="med"/>
-                      <a:tailEnd type="none" w="med" len="med"/>
-                    </a:lnL>
-                    <a:lnR w="12700" cap="flat" cmpd="sng" algn="ctr">
-                      <a:solidFill>
-                        <a:schemeClr val="tx1"/>
-                      </a:solidFill>
-                      <a:prstDash val="solid"/>
-                      <a:round/>
-                      <a:headEnd type="none" w="med" len="med"/>
-                      <a:tailEnd type="none" w="med" len="med"/>
-                    </a:lnR>
-                    <a:lnT w="12700" cap="flat" cmpd="sng" algn="ctr">
-                      <a:solidFill>
-                        <a:schemeClr val="tx1"/>
-                      </a:solidFill>
-                      <a:prstDash val="solid"/>
-                      <a:round/>
-                      <a:headEnd type="none" w="med" len="med"/>
-                      <a:tailEnd type="none" w="med" len="med"/>
-                    </a:lnT>
-                    <a:lnB w="12700" cap="flat" cmpd="sng" algn="ctr">
-                      <a:solidFill>
-                        <a:schemeClr val="tx1"/>
-                      </a:solidFill>
-                      <a:prstDash val="solid"/>
-                      <a:round/>
-                      <a:headEnd type="none" w="med" len="med"/>
-                      <a:tailEnd type="none" w="med" len="med"/>
-                    </a:lnB>
-                    <a:lnTlToBr>
-                      <a:noFill/>
-                    </a:lnTlToBr>
-                    <a:lnBlToTr>
-                      <a:noFill/>
-                    </a:lnBlToTr>
-                    <a:noFill/>
-                  </a:tcPr>
-                </a:tc>
-                <a:tc>
-                  <a:txBody>
-                    <a:bodyPr/>
-                    <a:lstStyle/>
-                    <a:p>
-                      <a:pPr marL="0" marR="0" lvl="0" indent="0" algn="l" defTabSz="914400" rtl="0" eaLnBrk="1" fontAlgn="base" latinLnBrk="0" hangingPunct="1">
-                        <a:lnSpc>
-                          <a:spcPct val="100000"/>
-                        </a:lnSpc>
-                        <a:spcBef>
-                          <a:spcPct val="20000"/>
-                        </a:spcBef>
-                        <a:spcAft>
-                          <a:spcPct val="0"/>
-                        </a:spcAft>
-                        <a:buClrTx/>
-                        <a:buSzTx/>
-                        <a:buFontTx/>
-                        <a:buNone/>
-                        <a:tabLst/>
-                      </a:pPr>
-                      <a:endParaRPr kumimoji="0" lang="en-US" sz="2400" b="0" i="0" u="none" strike="noStrike" cap="none" normalizeH="0" baseline="0">
-                        <a:ln>
-                          <a:noFill/>
-                        </a:ln>
-                        <a:solidFill>
-                          <a:schemeClr val="tx1"/>
-                        </a:solidFill>
-                        <a:effectLst/>
-                        <a:latin typeface="Arial" charset="0"/>
-                      </a:endParaRPr>
-                    </a:p>
-                  </a:txBody>
-                  <a:tcPr horzOverflow="overflow">
-                    <a:lnL w="12700" cap="flat" cmpd="sng" algn="ctr">
-                      <a:solidFill>
-                        <a:schemeClr val="tx1"/>
-                      </a:solidFill>
-                      <a:prstDash val="solid"/>
-                      <a:round/>
-                      <a:headEnd type="none" w="med" len="med"/>
-                      <a:tailEnd type="none" w="med" len="med"/>
-                    </a:lnL>
-                    <a:lnR w="12700" cap="flat" cmpd="sng" algn="ctr">
-                      <a:solidFill>
-                        <a:schemeClr val="tx1"/>
-                      </a:solidFill>
-                      <a:prstDash val="solid"/>
-                      <a:round/>
-                      <a:headEnd type="none" w="med" len="med"/>
-                      <a:tailEnd type="none" w="med" len="med"/>
-                    </a:lnR>
-                    <a:lnT w="12700" cap="flat" cmpd="sng" algn="ctr">
-                      <a:solidFill>
-                        <a:schemeClr val="tx1"/>
-                      </a:solidFill>
-                      <a:prstDash val="solid"/>
-                      <a:round/>
-                      <a:headEnd type="none" w="med" len="med"/>
-                      <a:tailEnd type="none" w="med" len="med"/>
-                    </a:lnT>
-                    <a:lnB w="12700" cap="flat" cmpd="sng" algn="ctr">
-                      <a:solidFill>
-                        <a:schemeClr val="tx1"/>
-                      </a:solidFill>
-                      <a:prstDash val="solid"/>
-                      <a:round/>
-                      <a:headEnd type="none" w="med" len="med"/>
-                      <a:tailEnd type="none" w="med" len="med"/>
-                    </a:lnB>
-                    <a:lnTlToBr>
-                      <a:noFill/>
-                    </a:lnTlToBr>
-                    <a:lnBlToTr>
-                      <a:noFill/>
-                    </a:lnBlToTr>
-                    <a:noFill/>
-                  </a:tcPr>
-                </a:tc>
-                <a:tc>
-                  <a:txBody>
-                    <a:bodyPr/>
-                    <a:lstStyle/>
-                    <a:p>
-                      <a:pPr marL="0" marR="0" lvl="0" indent="0" algn="l" defTabSz="914400" rtl="0" eaLnBrk="1" fontAlgn="base" latinLnBrk="0" hangingPunct="1">
-                        <a:lnSpc>
-                          <a:spcPct val="100000"/>
-                        </a:lnSpc>
-                        <a:spcBef>
-                          <a:spcPct val="20000"/>
-                        </a:spcBef>
-                        <a:spcAft>
-                          <a:spcPct val="0"/>
-                        </a:spcAft>
-                        <a:buClrTx/>
-                        <a:buSzTx/>
-                        <a:buFontTx/>
-                        <a:buNone/>
-                        <a:tabLst/>
-                      </a:pPr>
-                      <a:endParaRPr kumimoji="0" lang="en-US" sz="2400" b="0" i="0" u="none" strike="noStrike" cap="none" normalizeH="0" baseline="0">
-                        <a:ln>
-                          <a:noFill/>
-                        </a:ln>
-                        <a:solidFill>
-                          <a:schemeClr val="tx1"/>
-                        </a:solidFill>
-                        <a:effectLst/>
-                        <a:latin typeface="Arial" charset="0"/>
-                      </a:endParaRPr>
-                    </a:p>
-                  </a:txBody>
-                  <a:tcPr horzOverflow="overflow">
-                    <a:lnL w="12700" cap="flat" cmpd="sng" algn="ctr">
-                      <a:solidFill>
-                        <a:schemeClr val="tx1"/>
-                      </a:solidFill>
-                      <a:prstDash val="solid"/>
-                      <a:round/>
-                      <a:headEnd type="none" w="med" len="med"/>
-                      <a:tailEnd type="none" w="med" len="med"/>
-                    </a:lnL>
-                    <a:lnR w="28575" cap="flat" cmpd="sng" algn="ctr">
-                      <a:solidFill>
-                        <a:schemeClr val="tx1"/>
-                      </a:solidFill>
-                      <a:prstDash val="solid"/>
-                      <a:round/>
-                      <a:headEnd type="none" w="med" len="med"/>
-                      <a:tailEnd type="none" w="med" len="med"/>
-                    </a:lnR>
-                    <a:lnT w="12700" cap="flat" cmpd="sng" algn="ctr">
-                      <a:solidFill>
-                        <a:schemeClr val="tx1"/>
-                      </a:solidFill>
-                      <a:prstDash val="solid"/>
-                      <a:round/>
-                      <a:headEnd type="none" w="med" len="med"/>
-                      <a:tailEnd type="none" w="med" len="med"/>
-                    </a:lnT>
-                    <a:lnB w="12700" cap="flat" cmpd="sng" algn="ctr">
-                      <a:solidFill>
-                        <a:schemeClr val="tx1"/>
-                      </a:solidFill>
-                      <a:prstDash val="solid"/>
-                      <a:round/>
-                      <a:headEnd type="none" w="med" len="med"/>
-                      <a:tailEnd type="none" w="med" len="med"/>
-                    </a:lnB>
-                    <a:lnTlToBr>
-                      <a:noFill/>
-                    </a:lnTlToBr>
-                    <a:lnBlToTr>
-                      <a:noFill/>
-                    </a:lnBlToTr>
-                    <a:noFill/>
-                  </a:tcPr>
-                </a:tc>
-                <a:extLst>
-                  <a:ext uri="{0D108BD9-81ED-4DB2-BD59-A6C34878D82A}">
-                    <a16:rowId xmlns:a16="http://schemas.microsoft.com/office/drawing/2014/main" val="10001"/>
-                  </a:ext>
-                </a:extLst>
-              </a:tr>
-              <a:tr h="882650">
-                <a:tc>
-                  <a:txBody>
-                    <a:bodyPr/>
-                    <a:lstStyle/>
-                    <a:p>
-                      <a:pPr marL="0" marR="0" lvl="0" indent="0" algn="l" defTabSz="914400" rtl="0" eaLnBrk="1" fontAlgn="base" latinLnBrk="0" hangingPunct="1">
-                        <a:lnSpc>
-                          <a:spcPct val="100000"/>
-                        </a:lnSpc>
-                        <a:spcBef>
-                          <a:spcPct val="20000"/>
-                        </a:spcBef>
-                        <a:spcAft>
-                          <a:spcPct val="0"/>
-                        </a:spcAft>
-                        <a:buClrTx/>
-                        <a:buSzTx/>
-                        <a:buFontTx/>
-                        <a:buNone/>
-                        <a:tabLst/>
-                      </a:pPr>
-                      <a:r>
-                        <a:rPr kumimoji="0" lang="en-US" sz="2400" b="0" i="0" u="none" strike="noStrike" cap="none" normalizeH="0" baseline="0">
-                          <a:ln>
-                            <a:noFill/>
-                          </a:ln>
-                          <a:solidFill>
-                            <a:schemeClr val="tx1"/>
-                          </a:solidFill>
-                          <a:effectLst/>
-                          <a:latin typeface="Arial" charset="0"/>
-                        </a:rPr>
-                        <a:t>Pessimists</a:t>
-                      </a:r>
-                    </a:p>
-                  </a:txBody>
-                  <a:tcPr horzOverflow="overflow">
-                    <a:lnL w="28575" cap="flat" cmpd="sng" algn="ctr">
-                      <a:solidFill>
-                        <a:schemeClr val="tx1"/>
-                      </a:solidFill>
-                      <a:prstDash val="solid"/>
-                      <a:round/>
-                      <a:headEnd type="none" w="med" len="med"/>
-                      <a:tailEnd type="none" w="med" len="med"/>
-                    </a:lnL>
-                    <a:lnR w="12700" cap="flat" cmpd="sng" algn="ctr">
-                      <a:solidFill>
-                        <a:schemeClr val="tx1"/>
-                      </a:solidFill>
-                      <a:prstDash val="solid"/>
-                      <a:round/>
-                      <a:headEnd type="none" w="med" len="med"/>
-                      <a:tailEnd type="none" w="med" len="med"/>
-                    </a:lnR>
-                    <a:lnT w="12700" cap="flat" cmpd="sng" algn="ctr">
-                      <a:solidFill>
-                        <a:schemeClr val="tx1"/>
-                      </a:solidFill>
-                      <a:prstDash val="solid"/>
-                      <a:round/>
-                      <a:headEnd type="none" w="med" len="med"/>
-                      <a:tailEnd type="none" w="med" len="med"/>
-                    </a:lnT>
-                    <a:lnB w="28575" cap="flat" cmpd="sng" algn="ctr">
-                      <a:solidFill>
-                        <a:schemeClr val="tx1"/>
-                      </a:solidFill>
-                      <a:prstDash val="solid"/>
-                      <a:round/>
-                      <a:headEnd type="none" w="med" len="med"/>
-                      <a:tailEnd type="none" w="med" len="med"/>
-                    </a:lnB>
-                    <a:lnTlToBr>
-                      <a:noFill/>
-                    </a:lnTlToBr>
-                    <a:lnBlToTr>
-                      <a:noFill/>
-                    </a:lnBlToTr>
-                    <a:noFill/>
-                  </a:tcPr>
-                </a:tc>
-                <a:tc>
-                  <a:txBody>
-                    <a:bodyPr/>
-                    <a:lstStyle/>
-                    <a:p>
-                      <a:pPr marL="0" marR="0" lvl="0" indent="0" algn="l" defTabSz="914400" rtl="0" eaLnBrk="1" fontAlgn="base" latinLnBrk="0" hangingPunct="1">
-                        <a:lnSpc>
-                          <a:spcPct val="100000"/>
-                        </a:lnSpc>
-                        <a:spcBef>
-                          <a:spcPct val="20000"/>
-                        </a:spcBef>
-                        <a:spcAft>
-                          <a:spcPct val="0"/>
-                        </a:spcAft>
-                        <a:buClrTx/>
-                        <a:buSzTx/>
-                        <a:buFontTx/>
-                        <a:buNone/>
-                        <a:tabLst/>
-                      </a:pPr>
-                      <a:endParaRPr kumimoji="0" lang="en-US" sz="2400" b="0" i="0" u="none" strike="noStrike" cap="none" normalizeH="0" baseline="0">
-                        <a:ln>
-                          <a:noFill/>
-                        </a:ln>
-                        <a:solidFill>
-                          <a:schemeClr val="tx1"/>
-                        </a:solidFill>
-                        <a:effectLst/>
-                        <a:latin typeface="Arial" charset="0"/>
-                      </a:endParaRPr>
-                    </a:p>
-                  </a:txBody>
-                  <a:tcPr horzOverflow="overflow">
-                    <a:lnL w="12700" cap="flat" cmpd="sng" algn="ctr">
-                      <a:solidFill>
-                        <a:schemeClr val="tx1"/>
-                      </a:solidFill>
-                      <a:prstDash val="solid"/>
-                      <a:round/>
-                      <a:headEnd type="none" w="med" len="med"/>
-                      <a:tailEnd type="none" w="med" len="med"/>
-                    </a:lnL>
-                    <a:lnR w="12700" cap="flat" cmpd="sng" algn="ctr">
-                      <a:solidFill>
-                        <a:schemeClr val="tx1"/>
-                      </a:solidFill>
-                      <a:prstDash val="solid"/>
-                      <a:round/>
-                      <a:headEnd type="none" w="med" len="med"/>
-                      <a:tailEnd type="none" w="med" len="med"/>
-                    </a:lnR>
-                    <a:lnT w="12700" cap="flat" cmpd="sng" algn="ctr">
-                      <a:solidFill>
-                        <a:schemeClr val="tx1"/>
-                      </a:solidFill>
-                      <a:prstDash val="solid"/>
-                      <a:round/>
-                      <a:headEnd type="none" w="med" len="med"/>
-                      <a:tailEnd type="none" w="med" len="med"/>
-                    </a:lnT>
-                    <a:lnB w="28575" cap="flat" cmpd="sng" algn="ctr">
-                      <a:solidFill>
-                        <a:schemeClr val="tx1"/>
-                      </a:solidFill>
-                      <a:prstDash val="solid"/>
-                      <a:round/>
-                      <a:headEnd type="none" w="med" len="med"/>
-                      <a:tailEnd type="none" w="med" len="med"/>
-                    </a:lnB>
-                    <a:lnTlToBr>
-                      <a:noFill/>
-                    </a:lnTlToBr>
-                    <a:lnBlToTr>
-                      <a:noFill/>
-                    </a:lnBlToTr>
-                    <a:noFill/>
-                  </a:tcPr>
-                </a:tc>
-                <a:tc>
-                  <a:txBody>
-                    <a:bodyPr/>
-                    <a:lstStyle/>
-                    <a:p>
-                      <a:pPr marL="0" marR="0" lvl="0" indent="0" algn="l" defTabSz="914400" rtl="0" eaLnBrk="1" fontAlgn="base" latinLnBrk="0" hangingPunct="1">
-                        <a:lnSpc>
-                          <a:spcPct val="100000"/>
-                        </a:lnSpc>
-                        <a:spcBef>
-                          <a:spcPct val="20000"/>
-                        </a:spcBef>
-                        <a:spcAft>
-                          <a:spcPct val="0"/>
-                        </a:spcAft>
-                        <a:buClrTx/>
-                        <a:buSzTx/>
-                        <a:buFontTx/>
-                        <a:buNone/>
-                        <a:tabLst/>
-                      </a:pPr>
-                      <a:endParaRPr kumimoji="0" lang="en-US" sz="2400" b="0" i="0" u="none" strike="noStrike" cap="none" normalizeH="0" baseline="0">
-                        <a:ln>
-                          <a:noFill/>
-                        </a:ln>
-                        <a:solidFill>
-                          <a:schemeClr val="tx1"/>
-                        </a:solidFill>
-                        <a:effectLst/>
-                        <a:latin typeface="Arial" charset="0"/>
-                      </a:endParaRPr>
-                    </a:p>
-                  </a:txBody>
-                  <a:tcPr horzOverflow="overflow">
-                    <a:lnL w="12700" cap="flat" cmpd="sng" algn="ctr">
-                      <a:solidFill>
-                        <a:schemeClr val="tx1"/>
-                      </a:solidFill>
-                      <a:prstDash val="solid"/>
-                      <a:round/>
-                      <a:headEnd type="none" w="med" len="med"/>
-                      <a:tailEnd type="none" w="med" len="med"/>
-                    </a:lnL>
-                    <a:lnR w="28575" cap="flat" cmpd="sng" algn="ctr">
-                      <a:solidFill>
-                        <a:schemeClr val="tx1"/>
-                      </a:solidFill>
-                      <a:prstDash val="solid"/>
-                      <a:round/>
-                      <a:headEnd type="none" w="med" len="med"/>
-                      <a:tailEnd type="none" w="med" len="med"/>
-                    </a:lnR>
-                    <a:lnT w="12700" cap="flat" cmpd="sng" algn="ctr">
-                      <a:solidFill>
-                        <a:schemeClr val="tx1"/>
-                      </a:solidFill>
-                      <a:prstDash val="solid"/>
-                      <a:round/>
-                      <a:headEnd type="none" w="med" len="med"/>
-                      <a:tailEnd type="none" w="med" len="med"/>
-                    </a:lnT>
-                    <a:lnB w="28575" cap="flat" cmpd="sng" algn="ctr">
-                      <a:solidFill>
-                        <a:schemeClr val="tx1"/>
-                      </a:solidFill>
-                      <a:prstDash val="solid"/>
-                      <a:round/>
-                      <a:headEnd type="none" w="med" len="med"/>
-                      <a:tailEnd type="none" w="med" len="med"/>
-                    </a:lnB>
-                    <a:lnTlToBr>
-                      <a:noFill/>
-                    </a:lnTlToBr>
-                    <a:lnBlToTr>
-                      <a:noFill/>
-                    </a:lnBlToTr>
-                    <a:noFill/>
-                  </a:tcPr>
-                </a:tc>
-                <a:extLst>
-                  <a:ext uri="{0D108BD9-81ED-4DB2-BD59-A6C34878D82A}">
-                    <a16:rowId xmlns:a16="http://schemas.microsoft.com/office/drawing/2014/main" val="10002"/>
-                  </a:ext>
-                </a:extLst>
-              </a:tr>
-            </a:tbl>
-          </a:graphicData>
-        </a:graphic>
-      </p:graphicFrame>
-      <p:grpSp>
-        <p:nvGrpSpPr>
-          <p:cNvPr id="2" name="Group 20"/>
-          <p:cNvGrpSpPr>
-            <a:grpSpLocks/>
-          </p:cNvGrpSpPr>
-          <p:nvPr/>
-        </p:nvGrpSpPr>
-        <p:grpSpPr bwMode="auto">
-          <a:xfrm>
-            <a:off x="3733801" y="1447800"/>
-            <a:ext cx="1831975" cy="1208088"/>
-            <a:chOff x="1344" y="1031"/>
-            <a:chExt cx="1154" cy="761"/>
-          </a:xfrm>
-        </p:grpSpPr>
-        <p:sp>
-          <p:nvSpPr>
-            <p:cNvPr id="4118" name="Text Box 21"/>
-            <p:cNvSpPr txBox="1">
-              <a:spLocks noChangeArrowheads="1"/>
-            </p:cNvSpPr>
-            <p:nvPr/>
-          </p:nvSpPr>
-          <p:spPr bwMode="auto">
-            <a:xfrm>
-              <a:off x="1344" y="1031"/>
-              <a:ext cx="300" cy="233"/>
-            </a:xfrm>
-            <a:prstGeom prst="rect">
-              <a:avLst/>
-            </a:prstGeom>
-            <a:noFill/>
-            <a:ln w="9525">
-              <a:noFill/>
-              <a:miter lim="800000"/>
-              <a:headEnd/>
-              <a:tailEnd/>
-            </a:ln>
-          </p:spPr>
-          <p:txBody>
-            <a:bodyPr wrap="none">
-              <a:spAutoFit/>
-            </a:bodyPr>
-            <a:lstStyle/>
-            <a:p>
-              <a:r>
-                <a:rPr lang="en-US"/>
-                <a:t>6.5</a:t>
-              </a:r>
-            </a:p>
-          </p:txBody>
-        </p:sp>
-        <p:sp>
-          <p:nvSpPr>
-            <p:cNvPr id="4119" name="Text Box 22"/>
-            <p:cNvSpPr txBox="1">
-              <a:spLocks noChangeArrowheads="1"/>
-            </p:cNvSpPr>
-            <p:nvPr/>
-          </p:nvSpPr>
-          <p:spPr bwMode="auto">
-            <a:xfrm>
-              <a:off x="2198" y="1031"/>
-              <a:ext cx="300" cy="233"/>
-            </a:xfrm>
-            <a:prstGeom prst="rect">
-              <a:avLst/>
-            </a:prstGeom>
-            <a:noFill/>
-            <a:ln w="9525">
-              <a:noFill/>
-              <a:miter lim="800000"/>
-              <a:headEnd/>
-              <a:tailEnd/>
-            </a:ln>
-          </p:spPr>
-          <p:txBody>
-            <a:bodyPr wrap="none">
-              <a:spAutoFit/>
-            </a:bodyPr>
-            <a:lstStyle/>
-            <a:p>
-              <a:r>
-                <a:rPr lang="en-US"/>
-                <a:t>9.7</a:t>
-              </a:r>
-            </a:p>
-          </p:txBody>
-        </p:sp>
-        <p:sp>
-          <p:nvSpPr>
-            <p:cNvPr id="4120" name="Text Box 23"/>
-            <p:cNvSpPr txBox="1">
-              <a:spLocks noChangeArrowheads="1"/>
-            </p:cNvSpPr>
-            <p:nvPr/>
-          </p:nvSpPr>
-          <p:spPr bwMode="auto">
-            <a:xfrm>
-              <a:off x="1344" y="1559"/>
-              <a:ext cx="300" cy="233"/>
-            </a:xfrm>
-            <a:prstGeom prst="rect">
-              <a:avLst/>
-            </a:prstGeom>
-            <a:noFill/>
-            <a:ln w="9525">
-              <a:noFill/>
-              <a:miter lim="800000"/>
-              <a:headEnd/>
-              <a:tailEnd/>
-            </a:ln>
-          </p:spPr>
-          <p:txBody>
-            <a:bodyPr wrap="none">
-              <a:spAutoFit/>
-            </a:bodyPr>
-            <a:lstStyle/>
-            <a:p>
-              <a:r>
-                <a:rPr lang="en-US"/>
-                <a:t>6.5</a:t>
-              </a:r>
-            </a:p>
-          </p:txBody>
-        </p:sp>
-        <p:sp>
-          <p:nvSpPr>
-            <p:cNvPr id="4121" name="Text Box 24"/>
-            <p:cNvSpPr txBox="1">
-              <a:spLocks noChangeArrowheads="1"/>
-            </p:cNvSpPr>
-            <p:nvPr/>
-          </p:nvSpPr>
-          <p:spPr bwMode="auto">
-            <a:xfrm>
-              <a:off x="2198" y="1559"/>
-              <a:ext cx="300" cy="233"/>
-            </a:xfrm>
-            <a:prstGeom prst="rect">
-              <a:avLst/>
-            </a:prstGeom>
-            <a:noFill/>
-            <a:ln w="9525">
-              <a:noFill/>
-              <a:miter lim="800000"/>
-              <a:headEnd/>
-              <a:tailEnd/>
-            </a:ln>
-          </p:spPr>
-          <p:txBody>
-            <a:bodyPr wrap="none">
-              <a:spAutoFit/>
-            </a:bodyPr>
-            <a:lstStyle/>
-            <a:p>
-              <a:r>
-                <a:rPr lang="en-US"/>
-                <a:t>8.2</a:t>
-              </a:r>
-            </a:p>
-          </p:txBody>
-        </p:sp>
-      </p:grpSp>
-      <p:graphicFrame>
-        <p:nvGraphicFramePr>
-          <p:cNvPr id="49177" name="Object 25"/>
-          <p:cNvGraphicFramePr>
-            <a:graphicFrameLocks noChangeAspect="1"/>
-          </p:cNvGraphicFramePr>
-          <p:nvPr/>
-        </p:nvGraphicFramePr>
-        <p:xfrm>
-          <a:off x="5562600" y="3201989"/>
-          <a:ext cx="5105400" cy="3379787"/>
-        </p:xfrm>
-        <a:graphic>
-          <a:graphicData uri="http://schemas.openxmlformats.org/presentationml/2006/ole">
-            <mc:AlternateContent xmlns:mc="http://schemas.openxmlformats.org/markup-compatibility/2006">
-              <mc:Choice xmlns:v="urn:schemas-microsoft-com:vml" Requires="v">
-                <p:oleObj name="Chart" r:id="rId3" imgW="4419600" imgH="2924231" progId="MSGraph.Chart.8">
-                  <p:embed followColorScheme="full"/>
-                </p:oleObj>
-              </mc:Choice>
-              <mc:Fallback>
-                <p:oleObj name="Chart" r:id="rId3" imgW="4419600" imgH="2924231" progId="MSGraph.Chart.8">
-                  <p:embed followColorScheme="full"/>
-                  <p:pic>
-                    <p:nvPicPr>
-                      <p:cNvPr id="49177" name="Object 25"/>
-                      <p:cNvPicPr>
-                        <a:picLocks noChangeAspect="1" noChangeArrowheads="1"/>
-                      </p:cNvPicPr>
-                      <p:nvPr/>
-                    </p:nvPicPr>
-                    <p:blipFill>
-                      <a:blip r:embed="rId4"/>
-                      <a:srcRect/>
-                      <a:stretch>
-                        <a:fillRect/>
-                      </a:stretch>
-                    </p:blipFill>
-                    <p:spPr bwMode="auto">
-                      <a:xfrm>
-                        <a:off x="5562600" y="3201989"/>
-                        <a:ext cx="5105400" cy="3379787"/>
-                      </a:xfrm>
-                      <a:prstGeom prst="rect">
-                        <a:avLst/>
-                      </a:prstGeom>
-                      <a:noFill/>
-                      <a:extLst>
-                        <a:ext uri="{909E8E84-426E-40DD-AFC4-6F175D3DCCD1}">
-                          <a14:hiddenFill xmlns:a14="http://schemas.microsoft.com/office/drawing/2010/main">
-                            <a:solidFill>
-                              <a:srgbClr val="FFFFFF"/>
-                            </a:solidFill>
-                          </a14:hiddenFill>
-                        </a:ext>
-                      </a:extLst>
-                    </p:spPr>
-                  </p:pic>
-                </p:oleObj>
-              </mc:Fallback>
-            </mc:AlternateContent>
-          </a:graphicData>
-        </a:graphic>
-      </p:graphicFrame>
-    </p:spTree>
-    <p:extLst>
-      <p:ext uri="{BB962C8B-B14F-4D97-AF65-F5344CB8AC3E}">
-        <p14:creationId xmlns:p14="http://schemas.microsoft.com/office/powerpoint/2010/main" val="2680412434"/>
-      </p:ext>
-    </p:extLst>
-  </p:cSld>
-  <p:clrMapOvr>
-    <a:masterClrMapping/>
-  </p:clrMapOvr>
-  <p:timing>
-    <p:tnLst>
-      <p:par>
-        <p:cTn id="1" dur="indefinite" restart="never" nodeType="tmRoot">
-          <p:childTnLst>
-            <p:seq concurrent="1" nextAc="seek">
-              <p:cTn id="2" dur="indefinite" nodeType="mainSeq">
-                <p:childTnLst>
-                  <p:par>
-                    <p:cTn id="3" fill="hold">
-                      <p:stCondLst>
-                        <p:cond delay="indefinite"/>
-                      </p:stCondLst>
-                      <p:childTnLst>
-                        <p:par>
-                          <p:cTn id="4" fill="hold">
-                            <p:stCondLst>
-                              <p:cond delay="0"/>
-                            </p:stCondLst>
-                            <p:childTnLst>
-                              <p:par>
-                                <p:cTn id="5" presetID="1" presetClass="entr" presetSubtype="0" fill="hold" nodeType="clickEffect">
-                                  <p:stCondLst>
-                                    <p:cond delay="0"/>
-                                  </p:stCondLst>
-                                  <p:childTnLst>
-                                    <p:set>
-                                      <p:cBhvr>
-                                        <p:cTn id="6" dur="1" fill="hold">
-                                          <p:stCondLst>
-                                            <p:cond delay="0"/>
-                                          </p:stCondLst>
-                                        </p:cTn>
-                                        <p:tgtEl>
-                                          <p:spTgt spid="2"/>
-                                        </p:tgtEl>
-                                        <p:attrNameLst>
-                                          <p:attrName>style.visibility</p:attrName>
-                                        </p:attrNameLst>
-                                      </p:cBhvr>
-                                      <p:to>
-                                        <p:strVal val="visible"/>
-                                      </p:to>
-                                    </p:set>
-                                  </p:childTnLst>
-                                </p:cTn>
-                              </p:par>
-                            </p:childTnLst>
-                          </p:cTn>
-                        </p:par>
-                      </p:childTnLst>
-                    </p:cTn>
-                  </p:par>
-                  <p:par>
-                    <p:cTn id="7" fill="hold">
-                      <p:stCondLst>
-                        <p:cond delay="indefinite"/>
-                      </p:stCondLst>
-                      <p:childTnLst>
-                        <p:par>
-                          <p:cTn id="8" fill="hold">
-                            <p:stCondLst>
-                              <p:cond delay="0"/>
-                            </p:stCondLst>
-                            <p:childTnLst>
-                              <p:par>
-                                <p:cTn id="9" presetID="1" presetClass="entr" presetSubtype="0" fill="hold" grpId="0" nodeType="clickEffect">
-                                  <p:stCondLst>
-                                    <p:cond delay="0"/>
-                                  </p:stCondLst>
-                                  <p:childTnLst>
-                                    <p:set>
-                                      <p:cBhvr>
-                                        <p:cTn id="10" dur="1" fill="hold">
-                                          <p:stCondLst>
-                                            <p:cond delay="0"/>
-                                          </p:stCondLst>
-                                        </p:cTn>
-                                        <p:tgtEl>
-                                          <p:spTgt spid="49177"/>
-                                        </p:tgtEl>
-                                        <p:attrNameLst>
-                                          <p:attrName>style.visibility</p:attrName>
-                                        </p:attrNameLst>
-                                      </p:cBhvr>
-                                      <p:to>
-                                        <p:strVal val="visible"/>
-                                      </p:to>
-                                    </p:set>
-                                  </p:childTnLst>
-                                </p:cTn>
-                              </p:par>
-                            </p:childTnLst>
-                          </p:cTn>
-                        </p:par>
-                      </p:childTnLst>
-                    </p:cTn>
-                  </p:par>
-                </p:childTnLst>
-              </p:cTn>
-              <p:prevCondLst>
-                <p:cond evt="onPrev" delay="0">
-                  <p:tgtEl>
-                    <p:sldTgt/>
-                  </p:tgtEl>
-                </p:cond>
-              </p:prevCondLst>
-              <p:nextCondLst>
-                <p:cond evt="onNext" delay="0">
-                  <p:tgtEl>
-                    <p:sldTgt/>
-                  </p:tgtEl>
-                </p:cond>
-              </p:nextCondLst>
-            </p:seq>
-          </p:childTnLst>
-        </p:cTn>
-      </p:par>
-    </p:tnLst>
-    <p:bldLst>
-      <p:bldOleChart spid="49177" grpId="0"/>
-    </p:bldLst>
-  </p:timing>
 </p:sld>
 </file>
 

</xml_diff>